<commit_message>
Updates to german grammar
</commit_message>
<xml_diff>
--- a/images/image_sources/trading_training_instructions.pptx
+++ b/images/image_sources/trading_training_instructions.pptx
@@ -110,7 +110,7 @@
   </p:defaultTextStyle>
   <p:extLst>
     <p:ext uri="{EFAFB233-063F-42B5-8137-9DF3F51BA10A}">
-      <p15:sldGuideLst xmlns="" xmlns:p15="http://schemas.microsoft.com/office/powerpoint/2012/main"/>
+      <p15:sldGuideLst xmlns:p15="http://schemas.microsoft.com/office/powerpoint/2012/main" xmlns=""/>
     </p:ext>
   </p:extLst>
 </p:presentation>
@@ -247,7 +247,7 @@
           <a:p>
             <a:fld id="{029D4A10-DAC8-EA42-A428-F53FB85C1636}" type="datetimeFigureOut">
               <a:rPr lang="en-US" smtClean="0"/>
-              <a:t>10/10/16</a:t>
+              <a:t>10/15/16</a:t>
             </a:fld>
             <a:endParaRPr lang="en-US"/>
           </a:p>
@@ -417,7 +417,7 @@
           <a:p>
             <a:fld id="{029D4A10-DAC8-EA42-A428-F53FB85C1636}" type="datetimeFigureOut">
               <a:rPr lang="en-US" smtClean="0"/>
-              <a:t>10/10/16</a:t>
+              <a:t>10/15/16</a:t>
             </a:fld>
             <a:endParaRPr lang="en-US"/>
           </a:p>
@@ -597,7 +597,7 @@
           <a:p>
             <a:fld id="{029D4A10-DAC8-EA42-A428-F53FB85C1636}" type="datetimeFigureOut">
               <a:rPr lang="en-US" smtClean="0"/>
-              <a:t>10/10/16</a:t>
+              <a:t>10/15/16</a:t>
             </a:fld>
             <a:endParaRPr lang="en-US"/>
           </a:p>
@@ -767,7 +767,7 @@
           <a:p>
             <a:fld id="{029D4A10-DAC8-EA42-A428-F53FB85C1636}" type="datetimeFigureOut">
               <a:rPr lang="en-US" smtClean="0"/>
-              <a:t>10/10/16</a:t>
+              <a:t>10/15/16</a:t>
             </a:fld>
             <a:endParaRPr lang="en-US"/>
           </a:p>
@@ -1013,7 +1013,7 @@
           <a:p>
             <a:fld id="{029D4A10-DAC8-EA42-A428-F53FB85C1636}" type="datetimeFigureOut">
               <a:rPr lang="en-US" smtClean="0"/>
-              <a:t>10/10/16</a:t>
+              <a:t>10/15/16</a:t>
             </a:fld>
             <a:endParaRPr lang="en-US"/>
           </a:p>
@@ -1245,7 +1245,7 @@
           <a:p>
             <a:fld id="{029D4A10-DAC8-EA42-A428-F53FB85C1636}" type="datetimeFigureOut">
               <a:rPr lang="en-US" smtClean="0"/>
-              <a:t>10/10/16</a:t>
+              <a:t>10/15/16</a:t>
             </a:fld>
             <a:endParaRPr lang="en-US"/>
           </a:p>
@@ -1612,7 +1612,7 @@
           <a:p>
             <a:fld id="{029D4A10-DAC8-EA42-A428-F53FB85C1636}" type="datetimeFigureOut">
               <a:rPr lang="en-US" smtClean="0"/>
-              <a:t>10/10/16</a:t>
+              <a:t>10/15/16</a:t>
             </a:fld>
             <a:endParaRPr lang="en-US"/>
           </a:p>
@@ -1730,7 +1730,7 @@
           <a:p>
             <a:fld id="{029D4A10-DAC8-EA42-A428-F53FB85C1636}" type="datetimeFigureOut">
               <a:rPr lang="en-US" smtClean="0"/>
-              <a:t>10/10/16</a:t>
+              <a:t>10/15/16</a:t>
             </a:fld>
             <a:endParaRPr lang="en-US"/>
           </a:p>
@@ -1825,7 +1825,7 @@
           <a:p>
             <a:fld id="{029D4A10-DAC8-EA42-A428-F53FB85C1636}" type="datetimeFigureOut">
               <a:rPr lang="en-US" smtClean="0"/>
-              <a:t>10/10/16</a:t>
+              <a:t>10/15/16</a:t>
             </a:fld>
             <a:endParaRPr lang="en-US"/>
           </a:p>
@@ -2102,7 +2102,7 @@
           <a:p>
             <a:fld id="{029D4A10-DAC8-EA42-A428-F53FB85C1636}" type="datetimeFigureOut">
               <a:rPr lang="en-US" smtClean="0"/>
-              <a:t>10/10/16</a:t>
+              <a:t>10/15/16</a:t>
             </a:fld>
             <a:endParaRPr lang="en-US"/>
           </a:p>
@@ -2355,7 +2355,7 @@
           <a:p>
             <a:fld id="{029D4A10-DAC8-EA42-A428-F53FB85C1636}" type="datetimeFigureOut">
               <a:rPr lang="en-US" smtClean="0"/>
-              <a:t>10/10/16</a:t>
+              <a:t>10/15/16</a:t>
             </a:fld>
             <a:endParaRPr lang="en-US"/>
           </a:p>
@@ -2568,7 +2568,7 @@
           <a:p>
             <a:fld id="{029D4A10-DAC8-EA42-A428-F53FB85C1636}" type="datetimeFigureOut">
               <a:rPr lang="en-US" smtClean="0"/>
-              <a:t>10/10/16</a:t>
+              <a:t>10/15/16</a:t>
             </a:fld>
             <a:endParaRPr lang="en-US"/>
           </a:p>
@@ -4967,7 +4967,7 @@
                 <a:ea typeface="Open Sans Condensed Light" charset="0"/>
                 <a:cs typeface="Open Sans Condensed Light" charset="0"/>
               </a:rPr>
-              <a:t>dieser</a:t>
+              <a:t>diesen</a:t>
             </a:r>
             <a:r>
               <a:rPr lang="en-US" sz="2400" dirty="0" smtClean="0">
@@ -5011,7 +5011,7 @@
                 <a:ea typeface="Open Sans Condensed Light" charset="0"/>
                 <a:cs typeface="Open Sans Condensed Light" charset="0"/>
               </a:rPr>
-              <a:t>strukturiertes</a:t>
+              <a:t>strukturierten</a:t>
             </a:r>
             <a:r>
               <a:rPr lang="en-US" sz="2400" dirty="0" smtClean="0">
@@ -5033,7 +5033,7 @@
                 <a:ea typeface="Open Sans Condensed Light" charset="0"/>
                 <a:cs typeface="Open Sans Condensed Light" charset="0"/>
               </a:rPr>
-              <a:t>Produkt</a:t>
+              <a:t>Produkts</a:t>
             </a:r>
             <a:r>
               <a:rPr lang="en-US" sz="2400" dirty="0" smtClean="0">
@@ -6737,7 +6737,7 @@
   <a:extraClrSchemeLst/>
   <a:extLst>
     <a:ext uri="{05A4C25C-085E-4340-85A3-A5531E510DB2}">
-      <thm15:themeFamily xmlns="" xmlns:thm15="http://schemas.microsoft.com/office/thememl/2012/main" name="Office Theme" id="{62F939B6-93AF-4DB8-9C6B-D6C7DFDC589F}" vid="{4A3C46E8-61CC-4603-A589-7422A47A8E4A}"/>
+      <thm15:themeFamily xmlns:thm15="http://schemas.microsoft.com/office/thememl/2012/main" xmlns="" name="Office Theme" id="{62F939B6-93AF-4DB8-9C6B-D6C7DFDC589F}" vid="{4A3C46E8-61CC-4603-A589-7422A47A8E4A}"/>
     </a:ext>
   </a:extLst>
 </a:theme>

</xml_diff>